<commit_message>
Final Build with finalized PowerPoint
Also removed the unnecessary files that were there.
</commit_message>
<xml_diff>
--- a/SM_Calendar/EECS448-Project1.pptx
+++ b/SM_Calendar/EECS448-Project1.pptx
@@ -109,6 +109,11 @@
       </a:defRPr>
     </a:lvl9pPr>
   </p:defaultTextStyle>
+  <p:extLst>
+    <p:ext uri="{EFAFB233-063F-42B5-8137-9DF3F51BA10A}">
+      <p15:sldGuideLst xmlns:p15="http://schemas.microsoft.com/office/powerpoint/2012/main"/>
+    </p:ext>
+  </p:extLst>
 </p:presentation>
 </file>
 
@@ -341,7 +346,7 @@
           <a:p>
             <a:fld id="{32D3AE0E-3073-4CF2-A022-7F87265AF60D}" type="datetimeFigureOut">
               <a:rPr lang="en-US" smtClean="0"/>
-              <a:t>9/16/2016</a:t>
+              <a:t>9/18/2016</a:t>
             </a:fld>
             <a:endParaRPr lang="en-US"/>
           </a:p>
@@ -675,7 +680,7 @@
           <a:p>
             <a:fld id="{32D3AE0E-3073-4CF2-A022-7F87265AF60D}" type="datetimeFigureOut">
               <a:rPr lang="en-US" smtClean="0"/>
-              <a:t>9/16/2016</a:t>
+              <a:t>9/18/2016</a:t>
             </a:fld>
             <a:endParaRPr lang="en-US"/>
           </a:p>
@@ -953,7 +958,7 @@
           <a:p>
             <a:fld id="{32D3AE0E-3073-4CF2-A022-7F87265AF60D}" type="datetimeFigureOut">
               <a:rPr lang="en-US" smtClean="0"/>
-              <a:t>9/16/2016</a:t>
+              <a:t>9/18/2016</a:t>
             </a:fld>
             <a:endParaRPr lang="en-US"/>
           </a:p>
@@ -1521,7 +1526,7 @@
           <a:p>
             <a:fld id="{32D3AE0E-3073-4CF2-A022-7F87265AF60D}" type="datetimeFigureOut">
               <a:rPr lang="en-US" smtClean="0"/>
-              <a:t>9/16/2016</a:t>
+              <a:t>9/18/2016</a:t>
             </a:fld>
             <a:endParaRPr lang="en-US"/>
           </a:p>
@@ -1799,7 +1804,7 @@
           <a:p>
             <a:fld id="{32D3AE0E-3073-4CF2-A022-7F87265AF60D}" type="datetimeFigureOut">
               <a:rPr lang="en-US" smtClean="0"/>
-              <a:t>9/16/2016</a:t>
+              <a:t>9/18/2016</a:t>
             </a:fld>
             <a:endParaRPr lang="en-US"/>
           </a:p>
@@ -2361,7 +2366,7 @@
           <a:p>
             <a:fld id="{32D3AE0E-3073-4CF2-A022-7F87265AF60D}" type="datetimeFigureOut">
               <a:rPr lang="en-US" smtClean="0"/>
-              <a:t>9/16/2016</a:t>
+              <a:t>9/18/2016</a:t>
             </a:fld>
             <a:endParaRPr lang="en-US"/>
           </a:p>
@@ -2688,7 +2693,7 @@
           <a:p>
             <a:fld id="{32D3AE0E-3073-4CF2-A022-7F87265AF60D}" type="datetimeFigureOut">
               <a:rPr lang="en-US" smtClean="0"/>
-              <a:t>9/16/2016</a:t>
+              <a:t>9/18/2016</a:t>
             </a:fld>
             <a:endParaRPr lang="en-US"/>
           </a:p>
@@ -2865,7 +2870,7 @@
           <a:p>
             <a:fld id="{32D3AE0E-3073-4CF2-A022-7F87265AF60D}" type="datetimeFigureOut">
               <a:rPr lang="en-US" smtClean="0"/>
-              <a:t>9/16/2016</a:t>
+              <a:t>9/18/2016</a:t>
             </a:fld>
             <a:endParaRPr lang="en-US"/>
           </a:p>
@@ -3103,7 +3108,7 @@
           <a:p>
             <a:fld id="{32D3AE0E-3073-4CF2-A022-7F87265AF60D}" type="datetimeFigureOut">
               <a:rPr lang="en-US" smtClean="0"/>
-              <a:t>9/16/2016</a:t>
+              <a:t>9/18/2016</a:t>
             </a:fld>
             <a:endParaRPr lang="en-US"/>
           </a:p>
@@ -3303,7 +3308,7 @@
           <a:p>
             <a:fld id="{32D3AE0E-3073-4CF2-A022-7F87265AF60D}" type="datetimeFigureOut">
               <a:rPr lang="en-US" smtClean="0"/>
-              <a:t>9/16/2016</a:t>
+              <a:t>9/18/2016</a:t>
             </a:fld>
             <a:endParaRPr lang="en-US"/>
           </a:p>
@@ -3579,7 +3584,7 @@
           <a:p>
             <a:fld id="{32D3AE0E-3073-4CF2-A022-7F87265AF60D}" type="datetimeFigureOut">
               <a:rPr lang="en-US" smtClean="0"/>
-              <a:t>9/16/2016</a:t>
+              <a:t>9/18/2016</a:t>
             </a:fld>
             <a:endParaRPr lang="en-US"/>
           </a:p>
@@ -3845,7 +3850,7 @@
           <a:p>
             <a:fld id="{32D3AE0E-3073-4CF2-A022-7F87265AF60D}" type="datetimeFigureOut">
               <a:rPr lang="en-US" smtClean="0"/>
-              <a:t>9/16/2016</a:t>
+              <a:t>9/18/2016</a:t>
             </a:fld>
             <a:endParaRPr lang="en-US"/>
           </a:p>
@@ -4219,7 +4224,7 @@
           <a:p>
             <a:fld id="{32D3AE0E-3073-4CF2-A022-7F87265AF60D}" type="datetimeFigureOut">
               <a:rPr lang="en-US" smtClean="0"/>
-              <a:t>9/16/2016</a:t>
+              <a:t>9/18/2016</a:t>
             </a:fld>
             <a:endParaRPr lang="en-US"/>
           </a:p>
@@ -4367,7 +4372,7 @@
           <a:p>
             <a:fld id="{32D3AE0E-3073-4CF2-A022-7F87265AF60D}" type="datetimeFigureOut">
               <a:rPr lang="en-US" smtClean="0"/>
-              <a:t>9/16/2016</a:t>
+              <a:t>9/18/2016</a:t>
             </a:fld>
             <a:endParaRPr lang="en-US"/>
           </a:p>
@@ -4492,7 +4497,7 @@
           <a:p>
             <a:fld id="{32D3AE0E-3073-4CF2-A022-7F87265AF60D}" type="datetimeFigureOut">
               <a:rPr lang="en-US" smtClean="0"/>
-              <a:t>9/16/2016</a:t>
+              <a:t>9/18/2016</a:t>
             </a:fld>
             <a:endParaRPr lang="en-US"/>
           </a:p>
@@ -4777,7 +4782,7 @@
           <a:p>
             <a:fld id="{32D3AE0E-3073-4CF2-A022-7F87265AF60D}" type="datetimeFigureOut">
               <a:rPr lang="en-US" smtClean="0"/>
-              <a:t>9/16/2016</a:t>
+              <a:t>9/18/2016</a:t>
             </a:fld>
             <a:endParaRPr lang="en-US"/>
           </a:p>
@@ -5101,7 +5106,7 @@
           <a:p>
             <a:fld id="{32D3AE0E-3073-4CF2-A022-7F87265AF60D}" type="datetimeFigureOut">
               <a:rPr lang="en-US" smtClean="0"/>
-              <a:t>9/16/2016</a:t>
+              <a:t>9/18/2016</a:t>
             </a:fld>
             <a:endParaRPr lang="en-US"/>
           </a:p>
@@ -5315,7 +5320,7 @@
           <a:p>
             <a:fld id="{32D3AE0E-3073-4CF2-A022-7F87265AF60D}" type="datetimeFigureOut">
               <a:rPr lang="en-US" smtClean="0"/>
-              <a:t>9/16/2016</a:t>
+              <a:t>9/18/2016</a:t>
             </a:fld>
             <a:endParaRPr lang="en-US"/>
           </a:p>
@@ -6180,6 +6185,20 @@
             </a:r>
           </a:p>
           <a:p>
+            <a:r>
+              <a:rPr lang="en-US" dirty="0"/>
+              <a:t>Moving between </a:t>
+            </a:r>
+            <a:r>
+              <a:rPr lang="en-US" dirty="0" err="1"/>
+              <a:t>between</a:t>
+            </a:r>
+            <a:r>
+              <a:rPr lang="en-US" dirty="0"/>
+              <a:t> platforms proved to be the biggest challenge and wasted the most time.</a:t>
+            </a:r>
+          </a:p>
+          <a:p>
             <a:endParaRPr lang="en-US" dirty="0"/>
           </a:p>
           <a:p>
@@ -6258,6 +6277,25 @@
               <a:rPr lang="en-US" dirty="0"/>
               <a:t>Different Users/Calendars</a:t>
             </a:r>
+          </a:p>
+          <a:p>
+            <a:r>
+              <a:rPr lang="en-US" dirty="0"/>
+              <a:t>We didn’t have enough time to implement week view for every month and were unable to upload to </a:t>
+            </a:r>
+            <a:r>
+              <a:rPr lang="en-US" dirty="0" err="1"/>
+              <a:t>Github</a:t>
+            </a:r>
+            <a:r>
+              <a:rPr lang="en-US" dirty="0"/>
+              <a:t> what we did finish in time. But our demonstration shows proof of </a:t>
+            </a:r>
+            <a:r>
+              <a:rPr lang="en-US"/>
+              <a:t>concept when it comes to week view.</a:t>
+            </a:r>
+            <a:endParaRPr lang="en-US" dirty="0"/>
           </a:p>
           <a:p>
             <a:r>

</xml_diff>